<commit_message>
Small updates to project lecture. Fixed link to lecture slides on website.
</commit_message>
<xml_diff>
--- a/ht19/lecture/Project.pptx
+++ b/ht19/lecture/Project.pptx
@@ -284,7 +284,7 @@
           <a:p>
             <a:fld id="{84CDA002-8C72-7A4F-8370-B63F0E5D61F4}" type="datetimeFigureOut">
               <a:rPr lang="en-US" smtClean="0"/>
-              <a:t>10/3/19</a:t>
+              <a:t>10/7/19</a:t>
             </a:fld>
             <a:endParaRPr lang="en-US"/>
           </a:p>
@@ -484,7 +484,7 @@
           <a:p>
             <a:fld id="{84CDA002-8C72-7A4F-8370-B63F0E5D61F4}" type="datetimeFigureOut">
               <a:rPr lang="en-US" smtClean="0"/>
-              <a:t>10/3/19</a:t>
+              <a:t>10/7/19</a:t>
             </a:fld>
             <a:endParaRPr lang="en-US"/>
           </a:p>
@@ -694,7 +694,7 @@
           <a:p>
             <a:fld id="{84CDA002-8C72-7A4F-8370-B63F0E5D61F4}" type="datetimeFigureOut">
               <a:rPr lang="en-US" smtClean="0"/>
-              <a:t>10/3/19</a:t>
+              <a:t>10/7/19</a:t>
             </a:fld>
             <a:endParaRPr lang="en-US"/>
           </a:p>
@@ -894,7 +894,7 @@
           <a:p>
             <a:fld id="{84CDA002-8C72-7A4F-8370-B63F0E5D61F4}" type="datetimeFigureOut">
               <a:rPr lang="en-US" smtClean="0"/>
-              <a:t>10/3/19</a:t>
+              <a:t>10/7/19</a:t>
             </a:fld>
             <a:endParaRPr lang="en-US"/>
           </a:p>
@@ -1170,7 +1170,7 @@
           <a:p>
             <a:fld id="{84CDA002-8C72-7A4F-8370-B63F0E5D61F4}" type="datetimeFigureOut">
               <a:rPr lang="en-US" smtClean="0"/>
-              <a:t>10/3/19</a:t>
+              <a:t>10/7/19</a:t>
             </a:fld>
             <a:endParaRPr lang="en-US"/>
           </a:p>
@@ -1438,7 +1438,7 @@
           <a:p>
             <a:fld id="{84CDA002-8C72-7A4F-8370-B63F0E5D61F4}" type="datetimeFigureOut">
               <a:rPr lang="en-US" smtClean="0"/>
-              <a:t>10/3/19</a:t>
+              <a:t>10/7/19</a:t>
             </a:fld>
             <a:endParaRPr lang="en-US"/>
           </a:p>
@@ -1853,7 +1853,7 @@
           <a:p>
             <a:fld id="{84CDA002-8C72-7A4F-8370-B63F0E5D61F4}" type="datetimeFigureOut">
               <a:rPr lang="en-US" smtClean="0"/>
-              <a:t>10/3/19</a:t>
+              <a:t>10/7/19</a:t>
             </a:fld>
             <a:endParaRPr lang="en-US"/>
           </a:p>
@@ -1995,7 +1995,7 @@
           <a:p>
             <a:fld id="{84CDA002-8C72-7A4F-8370-B63F0E5D61F4}" type="datetimeFigureOut">
               <a:rPr lang="en-US" smtClean="0"/>
-              <a:t>10/3/19</a:t>
+              <a:t>10/7/19</a:t>
             </a:fld>
             <a:endParaRPr lang="en-US"/>
           </a:p>
@@ -2108,7 +2108,7 @@
           <a:p>
             <a:fld id="{84CDA002-8C72-7A4F-8370-B63F0E5D61F4}" type="datetimeFigureOut">
               <a:rPr lang="en-US" smtClean="0"/>
-              <a:t>10/3/19</a:t>
+              <a:t>10/7/19</a:t>
             </a:fld>
             <a:endParaRPr lang="en-US"/>
           </a:p>
@@ -2421,7 +2421,7 @@
           <a:p>
             <a:fld id="{84CDA002-8C72-7A4F-8370-B63F0E5D61F4}" type="datetimeFigureOut">
               <a:rPr lang="en-US" smtClean="0"/>
-              <a:t>10/3/19</a:t>
+              <a:t>10/7/19</a:t>
             </a:fld>
             <a:endParaRPr lang="en-US"/>
           </a:p>
@@ -2710,7 +2710,7 @@
           <a:p>
             <a:fld id="{84CDA002-8C72-7A4F-8370-B63F0E5D61F4}" type="datetimeFigureOut">
               <a:rPr lang="en-US" smtClean="0"/>
-              <a:t>10/3/19</a:t>
+              <a:t>10/7/19</a:t>
             </a:fld>
             <a:endParaRPr lang="en-US"/>
           </a:p>
@@ -2976,7 +2976,7 @@
           <a:p>
             <a:fld id="{84CDA002-8C72-7A4F-8370-B63F0E5D61F4}" type="datetimeFigureOut">
               <a:rPr lang="en-US" smtClean="0"/>
-              <a:t>10/3/19</a:t>
+              <a:t>10/7/19</a:t>
             </a:fld>
             <a:endParaRPr lang="en-US"/>
           </a:p>
@@ -3696,7 +3696,14 @@
             </a:r>
             <a:r>
               <a:rPr lang="sv-SE" sz="2400" dirty="0"/>
-              <a:t>' source - </a:t>
+              <a:t>’ </a:t>
+            </a:r>
+          </a:p>
+          <a:p>
+            <a:pPr algn="just"/>
+            <a:r>
+              <a:rPr lang="sv-SE" sz="2400" dirty="0"/>
+              <a:t>source - </a:t>
             </a:r>
             <a:r>
               <a:rPr lang="sv-SE" sz="2400" dirty="0" err="1"/>
@@ -3839,7 +3846,7 @@
             </a:r>
             <a:r>
               <a:rPr lang="sv-SE" sz="2400" dirty="0"/>
-              <a:t> and UTR} </a:t>
+              <a:t> and UTR}.</a:t>
             </a:r>
           </a:p>
           <a:p>
@@ -3886,7 +3893,7 @@
             </a:r>
             <a:r>
               <a:rPr lang="sv-SE" sz="2400" dirty="0"/>
-              <a:t> at 1. </a:t>
+              <a:t> at 1</a:t>
             </a:r>
           </a:p>
           <a:p>
@@ -3933,7 +3940,7 @@
             </a:r>
             <a:r>
               <a:rPr lang="sv-SE" sz="2400" dirty="0"/>
-              <a:t> at 1. </a:t>
+              <a:t> at 1</a:t>
             </a:r>
           </a:p>
         </p:txBody>
@@ -4220,7 +4227,7 @@
             </a:r>
             <a:r>
               <a:rPr lang="sv-SE" sz="2400" dirty="0"/>
-              <a:t> '0', '1' or '2'.</a:t>
+              <a:t> '0', '1' or '2'</a:t>
             </a:r>
           </a:p>
           <a:p>

</xml_diff>